<commit_message>
comments on C programming tutorial
</commit_message>
<xml_diff>
--- a/cs449_c_tutorial_info.pptx
+++ b/cs449_c_tutorial_info.pptx
@@ -3446,53 +3446,6 @@
           </a:p>
         </p:txBody>
       </p:sp>
-      <p:sp>
-        <p:nvSpPr>
-          <p:cNvPr id="5" name="TextBox 4">
-            <a:extLst>
-              <a:ext uri="{FF2B5EF4-FFF2-40B4-BE49-F238E27FC236}">
-                <a16:creationId xmlns:a16="http://schemas.microsoft.com/office/drawing/2014/main" id="{9EAF12EB-AA25-4785-8CCD-844F644997A8}"/>
-              </a:ext>
-            </a:extLst>
-          </p:cNvPr>
-          <p:cNvSpPr txBox="1"/>
-          <p:nvPr/>
-        </p:nvSpPr>
-        <p:spPr>
-          <a:xfrm>
-            <a:off x="-148856" y="2080197"/>
-            <a:ext cx="8607056" cy="461665"/>
-          </a:xfrm>
-          <a:prstGeom prst="rect">
-            <a:avLst/>
-          </a:prstGeom>
-        </p:spPr>
-        <p:txBody>
-          <a:bodyPr wrap="square" rtlCol="0">
-            <a:spAutoFit/>
-          </a:bodyPr>
-          <a:lstStyle/>
-          <a:p>
-            <a:pPr lvl="1"/>
-            <a:r>
-              <a:rPr lang="en-US" sz="2400" dirty="0"/>
-              <a:t>Note solutions given in </a:t>
-            </a:r>
-            <a:r>
-              <a:rPr lang="en-US" sz="2400" dirty="0">
-                <a:solidFill>
-                  <a:srgbClr val="0070C0"/>
-                </a:solidFill>
-              </a:rPr>
-              <a:t>blue </a:t>
-            </a:r>
-            <a:r>
-              <a:rPr lang="en-US" sz="2400" dirty="0"/>
-              <a:t>are the “official” solutions.</a:t>
-            </a:r>
-          </a:p>
-        </p:txBody>
-      </p:sp>
     </p:spTree>
     <p:extLst>
       <p:ext uri="{BB962C8B-B14F-4D97-AF65-F5344CB8AC3E}">
@@ -5449,7 +5402,7 @@
           <a:p>
             <a:r>
               <a:rPr lang="en-US" sz="1600" dirty="0"/>
-              <a:t>Note flip assuming two’s complement convention on return statement.</a:t>
+              <a:t>Note negation (assuming two’s complement convention) on return statement.</a:t>
             </a:r>
           </a:p>
         </p:txBody>

</xml_diff>